<commit_message>
Add Overview section, add prefaces for some sections, update diagrams for display and clear
</commit_message>
<xml_diff>
--- a/docs/Clear.pptx
+++ b/docs/Clear.pptx
@@ -192,7 +192,7 @@
           <a:p>
             <a:fld id="{0BAC29A3-F74A-4A0E-BAC1-D5DFC749CF00}" type="datetimeFigureOut">
               <a:rPr lang="en-SG" smtClean="0"/>
-              <a:t>25/3/2020</a:t>
+              <a:t>27/3/2020</a:t>
             </a:fld>
             <a:endParaRPr lang="en-SG"/>
           </a:p>
@@ -741,7 +741,7 @@
           <a:p>
             <a:fld id="{9B83C82E-27F5-4045-82EE-E026C617D232}" type="datetimeFigureOut">
               <a:rPr lang="en-SG" smtClean="0"/>
-              <a:t>25/3/2020</a:t>
+              <a:t>27/3/2020</a:t>
             </a:fld>
             <a:endParaRPr lang="en-SG"/>
           </a:p>
@@ -911,7 +911,7 @@
           <a:p>
             <a:fld id="{9B83C82E-27F5-4045-82EE-E026C617D232}" type="datetimeFigureOut">
               <a:rPr lang="en-SG" smtClean="0"/>
-              <a:t>25/3/2020</a:t>
+              <a:t>27/3/2020</a:t>
             </a:fld>
             <a:endParaRPr lang="en-SG"/>
           </a:p>
@@ -1091,7 +1091,7 @@
           <a:p>
             <a:fld id="{9B83C82E-27F5-4045-82EE-E026C617D232}" type="datetimeFigureOut">
               <a:rPr lang="en-SG" smtClean="0"/>
-              <a:t>25/3/2020</a:t>
+              <a:t>27/3/2020</a:t>
             </a:fld>
             <a:endParaRPr lang="en-SG"/>
           </a:p>
@@ -1261,7 +1261,7 @@
           <a:p>
             <a:fld id="{9B83C82E-27F5-4045-82EE-E026C617D232}" type="datetimeFigureOut">
               <a:rPr lang="en-SG" smtClean="0"/>
-              <a:t>25/3/2020</a:t>
+              <a:t>27/3/2020</a:t>
             </a:fld>
             <a:endParaRPr lang="en-SG"/>
           </a:p>
@@ -1507,7 +1507,7 @@
           <a:p>
             <a:fld id="{9B83C82E-27F5-4045-82EE-E026C617D232}" type="datetimeFigureOut">
               <a:rPr lang="en-SG" smtClean="0"/>
-              <a:t>25/3/2020</a:t>
+              <a:t>27/3/2020</a:t>
             </a:fld>
             <a:endParaRPr lang="en-SG"/>
           </a:p>
@@ -1795,7 +1795,7 @@
           <a:p>
             <a:fld id="{9B83C82E-27F5-4045-82EE-E026C617D232}" type="datetimeFigureOut">
               <a:rPr lang="en-SG" smtClean="0"/>
-              <a:t>25/3/2020</a:t>
+              <a:t>27/3/2020</a:t>
             </a:fld>
             <a:endParaRPr lang="en-SG"/>
           </a:p>
@@ -2217,7 +2217,7 @@
           <a:p>
             <a:fld id="{9B83C82E-27F5-4045-82EE-E026C617D232}" type="datetimeFigureOut">
               <a:rPr lang="en-SG" smtClean="0"/>
-              <a:t>25/3/2020</a:t>
+              <a:t>27/3/2020</a:t>
             </a:fld>
             <a:endParaRPr lang="en-SG"/>
           </a:p>
@@ -2335,7 +2335,7 @@
           <a:p>
             <a:fld id="{9B83C82E-27F5-4045-82EE-E026C617D232}" type="datetimeFigureOut">
               <a:rPr lang="en-SG" smtClean="0"/>
-              <a:t>25/3/2020</a:t>
+              <a:t>27/3/2020</a:t>
             </a:fld>
             <a:endParaRPr lang="en-SG"/>
           </a:p>
@@ -2430,7 +2430,7 @@
           <a:p>
             <a:fld id="{9B83C82E-27F5-4045-82EE-E026C617D232}" type="datetimeFigureOut">
               <a:rPr lang="en-SG" smtClean="0"/>
-              <a:t>25/3/2020</a:t>
+              <a:t>27/3/2020</a:t>
             </a:fld>
             <a:endParaRPr lang="en-SG"/>
           </a:p>
@@ -2707,7 +2707,7 @@
           <a:p>
             <a:fld id="{9B83C82E-27F5-4045-82EE-E026C617D232}" type="datetimeFigureOut">
               <a:rPr lang="en-SG" smtClean="0"/>
-              <a:t>25/3/2020</a:t>
+              <a:t>27/3/2020</a:t>
             </a:fld>
             <a:endParaRPr lang="en-SG"/>
           </a:p>
@@ -2960,7 +2960,7 @@
           <a:p>
             <a:fld id="{9B83C82E-27F5-4045-82EE-E026C617D232}" type="datetimeFigureOut">
               <a:rPr lang="en-SG" smtClean="0"/>
-              <a:t>25/3/2020</a:t>
+              <a:t>27/3/2020</a:t>
             </a:fld>
             <a:endParaRPr lang="en-SG"/>
           </a:p>
@@ -3173,7 +3173,7 @@
           <a:p>
             <a:fld id="{9B83C82E-27F5-4045-82EE-E026C617D232}" type="datetimeFigureOut">
               <a:rPr lang="en-SG" smtClean="0"/>
-              <a:t>25/3/2020</a:t>
+              <a:t>27/3/2020</a:t>
             </a:fld>
             <a:endParaRPr lang="en-SG"/>
           </a:p>
@@ -4286,7 +4286,7 @@
           <p:cNvPr id="42" name="Text Box 11">
             <a:extLst>
               <a:ext uri="{FF2B5EF4-FFF2-40B4-BE49-F238E27FC236}">
-                <a16:creationId xmlns:a16="http://schemas.microsoft.com/office/drawing/2014/main" xmlns="" id="{569EC1FF-3CDF-4E6B-82B3-104CCA3F3E9D}"/>
+                <a16:creationId xmlns="" xmlns:a16="http://schemas.microsoft.com/office/drawing/2014/main" id="{569EC1FF-3CDF-4E6B-82B3-104CCA3F3E9D}"/>
               </a:ext>
             </a:extLst>
           </p:cNvPr>
@@ -4366,7 +4366,7 @@
           <p:cNvPr id="43" name="Text Box 11">
             <a:extLst>
               <a:ext uri="{FF2B5EF4-FFF2-40B4-BE49-F238E27FC236}">
-                <a16:creationId xmlns:a16="http://schemas.microsoft.com/office/drawing/2014/main" xmlns="" id="{79ACA4C9-9678-4611-AE49-25FE7CAE8B35}"/>
+                <a16:creationId xmlns="" xmlns:a16="http://schemas.microsoft.com/office/drawing/2014/main" id="{79ACA4C9-9678-4611-AE49-25FE7CAE8B35}"/>
               </a:ext>
             </a:extLst>
           </p:cNvPr>
@@ -4428,13 +4428,26 @@
               <a:buNone/>
             </a:pPr>
             <a:r>
-              <a:rPr lang="en-US" sz="1500" dirty="0">
+              <a:rPr lang="en-US" sz="1500" dirty="0" smtClean="0">
                 <a:solidFill>
                   <a:prstClr val="black"/>
                 </a:solidFill>
               </a:rPr>
-              <a:t>:Duke</a:t>
-            </a:r>
+              <a:t>:</a:t>
+            </a:r>
+            <a:r>
+              <a:rPr lang="en-US" sz="1500" dirty="0" err="1" smtClean="0">
+                <a:solidFill>
+                  <a:prstClr val="black"/>
+                </a:solidFill>
+              </a:rPr>
+              <a:t>Shoco</a:t>
+            </a:r>
+            <a:endParaRPr lang="en-US" sz="1500" dirty="0">
+              <a:solidFill>
+                <a:prstClr val="black"/>
+              </a:solidFill>
+            </a:endParaRPr>
           </a:p>
         </p:txBody>
       </p:sp>
@@ -4443,7 +4456,7 @@
           <p:cNvPr id="44" name="Rectangle 43">
             <a:extLst>
               <a:ext uri="{FF2B5EF4-FFF2-40B4-BE49-F238E27FC236}">
-                <a16:creationId xmlns:a16="http://schemas.microsoft.com/office/drawing/2014/main" xmlns="" id="{1ABAE2EE-0C6F-40C9-9F83-C6E45146189B}"/>
+                <a16:creationId xmlns="" xmlns:a16="http://schemas.microsoft.com/office/drawing/2014/main" id="{1ABAE2EE-0C6F-40C9-9F83-C6E45146189B}"/>
               </a:ext>
             </a:extLst>
           </p:cNvPr>
@@ -4504,7 +4517,7 @@
           <p:cNvPr id="45" name="Line 15">
             <a:extLst>
               <a:ext uri="{FF2B5EF4-FFF2-40B4-BE49-F238E27FC236}">
-                <a16:creationId xmlns:a16="http://schemas.microsoft.com/office/drawing/2014/main" xmlns="" id="{0EB24DA8-2498-4853-AED4-3458A81C456A}"/>
+                <a16:creationId xmlns="" xmlns:a16="http://schemas.microsoft.com/office/drawing/2014/main" id="{0EB24DA8-2498-4853-AED4-3458A81C456A}"/>
               </a:ext>
             </a:extLst>
           </p:cNvPr>
@@ -4551,7 +4564,7 @@
           <p:cNvPr id="46" name="Line 15">
             <a:extLst>
               <a:ext uri="{FF2B5EF4-FFF2-40B4-BE49-F238E27FC236}">
-                <a16:creationId xmlns:a16="http://schemas.microsoft.com/office/drawing/2014/main" xmlns="" id="{9BC66A45-C94A-4E62-8981-39EC5DACDD6D}"/>
+                <a16:creationId xmlns="" xmlns:a16="http://schemas.microsoft.com/office/drawing/2014/main" id="{9BC66A45-C94A-4E62-8981-39EC5DACDD6D}"/>
               </a:ext>
             </a:extLst>
           </p:cNvPr>
@@ -4598,7 +4611,7 @@
           <p:cNvPr id="47" name="Text Box 25">
             <a:extLst>
               <a:ext uri="{FF2B5EF4-FFF2-40B4-BE49-F238E27FC236}">
-                <a16:creationId xmlns:a16="http://schemas.microsoft.com/office/drawing/2014/main" xmlns="" id="{342B431E-151F-4A55-A1AE-57F6FE56D1EF}"/>
+                <a16:creationId xmlns="" xmlns:a16="http://schemas.microsoft.com/office/drawing/2014/main" id="{342B431E-151F-4A55-A1AE-57F6FE56D1EF}"/>
               </a:ext>
             </a:extLst>
           </p:cNvPr>
@@ -4638,11 +4651,7 @@
             </a:pPr>
             <a:r>
               <a:rPr lang="en-US" sz="1500" i="1" dirty="0" err="1" smtClean="0"/>
-              <a:t>Clear</a:t>
-            </a:r>
-            <a:r>
-              <a:rPr lang="en-US" sz="1500" i="1" dirty="0" err="1" smtClean="0"/>
-              <a:t>Command</a:t>
+              <a:t>ClearCommand</a:t>
             </a:r>
             <a:r>
               <a:rPr lang="en-US" sz="1500" i="1" dirty="0" smtClean="0"/>
@@ -4657,7 +4666,7 @@
           <p:cNvPr id="48" name="Line 16">
             <a:extLst>
               <a:ext uri="{FF2B5EF4-FFF2-40B4-BE49-F238E27FC236}">
-                <a16:creationId xmlns:a16="http://schemas.microsoft.com/office/drawing/2014/main" xmlns="" id="{5278BFBC-6FA4-432C-994E-8DD2A55ED046}"/>
+                <a16:creationId xmlns="" xmlns:a16="http://schemas.microsoft.com/office/drawing/2014/main" id="{5278BFBC-6FA4-432C-994E-8DD2A55ED046}"/>
               </a:ext>
             </a:extLst>
           </p:cNvPr>
@@ -4703,7 +4712,7 @@
           <p:cNvPr id="49" name="Straight Connector 48">
             <a:extLst>
               <a:ext uri="{FF2B5EF4-FFF2-40B4-BE49-F238E27FC236}">
-                <a16:creationId xmlns:a16="http://schemas.microsoft.com/office/drawing/2014/main" xmlns="" id="{054EC965-613F-450A-BDA7-4AEF688EE06E}"/>
+                <a16:creationId xmlns="" xmlns:a16="http://schemas.microsoft.com/office/drawing/2014/main" id="{054EC965-613F-450A-BDA7-4AEF688EE06E}"/>
               </a:ext>
             </a:extLst>
           </p:cNvPr>
@@ -4746,7 +4755,7 @@
           <p:cNvPr id="50" name="Straight Connector 49">
             <a:extLst>
               <a:ext uri="{FF2B5EF4-FFF2-40B4-BE49-F238E27FC236}">
-                <a16:creationId xmlns:a16="http://schemas.microsoft.com/office/drawing/2014/main" xmlns="" id="{BCC52252-11B3-4A56-A114-AE5F1D9A8E9B}"/>
+                <a16:creationId xmlns="" xmlns:a16="http://schemas.microsoft.com/office/drawing/2014/main" id="{BCC52252-11B3-4A56-A114-AE5F1D9A8E9B}"/>
               </a:ext>
             </a:extLst>
           </p:cNvPr>
@@ -4789,7 +4798,7 @@
           <p:cNvPr id="51" name="Text Box 25">
             <a:extLst>
               <a:ext uri="{FF2B5EF4-FFF2-40B4-BE49-F238E27FC236}">
-                <a16:creationId xmlns:a16="http://schemas.microsoft.com/office/drawing/2014/main" xmlns="" id="{34020A70-184B-4A57-816D-CCE686742C10}"/>
+                <a16:creationId xmlns="" xmlns:a16="http://schemas.microsoft.com/office/drawing/2014/main" id="{34020A70-184B-4A57-816D-CCE686742C10}"/>
               </a:ext>
             </a:extLst>
           </p:cNvPr>
@@ -4839,7 +4848,7 @@
           <p:cNvPr id="52" name="Line 13">
             <a:extLst>
               <a:ext uri="{FF2B5EF4-FFF2-40B4-BE49-F238E27FC236}">
-                <a16:creationId xmlns:a16="http://schemas.microsoft.com/office/drawing/2014/main" xmlns="" id="{C30F3633-BE5D-441D-9C87-D00C0DFC3E6D}"/>
+                <a16:creationId xmlns="" xmlns:a16="http://schemas.microsoft.com/office/drawing/2014/main" id="{C30F3633-BE5D-441D-9C87-D00C0DFC3E6D}"/>
               </a:ext>
             </a:extLst>
           </p:cNvPr>
@@ -4899,7 +4908,7 @@
           <p:cNvPr id="53" name="Rectangle 52">
             <a:extLst>
               <a:ext uri="{FF2B5EF4-FFF2-40B4-BE49-F238E27FC236}">
-                <a16:creationId xmlns:a16="http://schemas.microsoft.com/office/drawing/2014/main" xmlns="" id="{E7397DF1-A503-43B8-9D46-710440F45D61}"/>
+                <a16:creationId xmlns="" xmlns:a16="http://schemas.microsoft.com/office/drawing/2014/main" id="{E7397DF1-A503-43B8-9D46-710440F45D61}"/>
               </a:ext>
             </a:extLst>
           </p:cNvPr>
@@ -4959,7 +4968,7 @@
           <p:cNvPr id="54" name="Straight Connector 53">
             <a:extLst>
               <a:ext uri="{FF2B5EF4-FFF2-40B4-BE49-F238E27FC236}">
-                <a16:creationId xmlns:a16="http://schemas.microsoft.com/office/drawing/2014/main" xmlns="" id="{BB6AEF2A-70C0-4C86-ACC0-ED4823D6AC46}"/>
+                <a16:creationId xmlns="" xmlns:a16="http://schemas.microsoft.com/office/drawing/2014/main" id="{BB6AEF2A-70C0-4C86-ACC0-ED4823D6AC46}"/>
               </a:ext>
             </a:extLst>
           </p:cNvPr>
@@ -5002,7 +5011,7 @@
           <p:cNvPr id="55" name="Straight Connector 54">
             <a:extLst>
               <a:ext uri="{FF2B5EF4-FFF2-40B4-BE49-F238E27FC236}">
-                <a16:creationId xmlns:a16="http://schemas.microsoft.com/office/drawing/2014/main" xmlns="" id="{9664B067-90B9-447F-947E-62F78A316229}"/>
+                <a16:creationId xmlns="" xmlns:a16="http://schemas.microsoft.com/office/drawing/2014/main" id="{9664B067-90B9-447F-947E-62F78A316229}"/>
               </a:ext>
             </a:extLst>
           </p:cNvPr>
@@ -5045,7 +5054,7 @@
           <p:cNvPr id="30" name="Line 16">
             <a:extLst>
               <a:ext uri="{FF2B5EF4-FFF2-40B4-BE49-F238E27FC236}">
-                <a16:creationId xmlns:a16="http://schemas.microsoft.com/office/drawing/2014/main" xmlns="" id="{189BA3D0-8AEC-4A1C-9374-3B627A9B1FF8}"/>
+                <a16:creationId xmlns="" xmlns:a16="http://schemas.microsoft.com/office/drawing/2014/main" id="{189BA3D0-8AEC-4A1C-9374-3B627A9B1FF8}"/>
               </a:ext>
             </a:extLst>
           </p:cNvPr>

</xml_diff>